<commit_message>
Advanced ML - Feature Selection & Dimensionality Reduction
Advanced ML - Feature Selection & Dimensionality Reduction
</commit_message>
<xml_diff>
--- a/7.Boosting Algorithm/Boosting Algorithms-Ada-XG-LG.pptx
+++ b/7.Boosting Algorithm/Boosting Algorithms-Ada-XG-LG.pptx
@@ -12,13 +12,17 @@
     <p:sldId id="261" r:id="rId6"/>
     <p:sldId id="262" r:id="rId7"/>
     <p:sldId id="263" r:id="rId8"/>
-    <p:sldId id="264" r:id="rId9"/>
-    <p:sldId id="266" r:id="rId10"/>
-    <p:sldId id="265" r:id="rId11"/>
-    <p:sldId id="267" r:id="rId12"/>
-    <p:sldId id="268" r:id="rId13"/>
-    <p:sldId id="269" r:id="rId14"/>
-    <p:sldId id="270" r:id="rId15"/>
+    <p:sldId id="272" r:id="rId9"/>
+    <p:sldId id="264" r:id="rId10"/>
+    <p:sldId id="271" r:id="rId11"/>
+    <p:sldId id="266" r:id="rId12"/>
+    <p:sldId id="265" r:id="rId13"/>
+    <p:sldId id="267" r:id="rId14"/>
+    <p:sldId id="274" r:id="rId15"/>
+    <p:sldId id="273" r:id="rId16"/>
+    <p:sldId id="268" r:id="rId17"/>
+    <p:sldId id="269" r:id="rId18"/>
+    <p:sldId id="270" r:id="rId19"/>
   </p:sldIdLst>
   <p:sldSz cx="9144000" cy="6858000" type="screen4x3"/>
   <p:notesSz cx="6858000" cy="9144000"/>
@@ -133,10 +137,14 @@
             <p14:sldId id="261"/>
             <p14:sldId id="262"/>
             <p14:sldId id="263"/>
+            <p14:sldId id="272"/>
             <p14:sldId id="264"/>
+            <p14:sldId id="271"/>
             <p14:sldId id="266"/>
             <p14:sldId id="265"/>
             <p14:sldId id="267"/>
+            <p14:sldId id="274"/>
+            <p14:sldId id="273"/>
             <p14:sldId id="268"/>
             <p14:sldId id="269"/>
             <p14:sldId id="270"/>
@@ -14715,10 +14723,118 @@
   <p:clrMapOvr>
     <a:masterClrMapping/>
   </p:clrMapOvr>
+  <p:timing>
+    <p:tnLst>
+      <p:par>
+        <p:cTn id="1" dur="indefinite" restart="never" nodeType="tmRoot"/>
+      </p:par>
+    </p:tnLst>
+  </p:timing>
 </p:sld>
 </file>
 
 <file path=ppt/slides/slide10.xml><?xml version="1.0" encoding="utf-8"?>
+<p:sld xmlns:a="http://schemas.openxmlformats.org/drawingml/2006/main" xmlns:r="http://schemas.openxmlformats.org/officeDocument/2006/relationships" xmlns:p="http://schemas.openxmlformats.org/presentationml/2006/main">
+  <p:cSld>
+    <p:spTree>
+      <p:nvGrpSpPr>
+        <p:cNvPr id="1" name=""/>
+        <p:cNvGrpSpPr/>
+        <p:nvPr/>
+      </p:nvGrpSpPr>
+      <p:grpSpPr>
+        <a:xfrm>
+          <a:off x="0" y="0"/>
+          <a:ext cx="0" cy="0"/>
+          <a:chOff x="0" y="0"/>
+          <a:chExt cx="0" cy="0"/>
+        </a:xfrm>
+      </p:grpSpPr>
+      <p:pic>
+        <p:nvPicPr>
+          <p:cNvPr id="1026" name="Picture 2"/>
+          <p:cNvPicPr>
+            <a:picLocks noChangeAspect="1" noChangeArrowheads="1"/>
+          </p:cNvPicPr>
+          <p:nvPr/>
+        </p:nvPicPr>
+        <p:blipFill>
+          <a:blip r:embed="rId2">
+            <a:extLst>
+              <a:ext uri="{28A0092B-C50C-407E-A947-70E740481C1C}">
+                <a14:useLocalDpi xmlns:a14="http://schemas.microsoft.com/office/drawing/2010/main" val="0"/>
+              </a:ext>
+            </a:extLst>
+          </a:blip>
+          <a:srcRect/>
+          <a:stretch>
+            <a:fillRect/>
+          </a:stretch>
+        </p:blipFill>
+        <p:spPr bwMode="auto">
+          <a:xfrm>
+            <a:off x="811213" y="1009650"/>
+            <a:ext cx="7521575" cy="4838700"/>
+          </a:xfrm>
+          <a:prstGeom prst="rect">
+            <a:avLst/>
+          </a:prstGeom>
+          <a:noFill/>
+          <a:ln>
+            <a:noFill/>
+          </a:ln>
+          <a:effectLst/>
+          <a:extLst>
+            <a:ext uri="{909E8E84-426E-40DD-AFC4-6F175D3DCCD1}">
+              <a14:hiddenFill xmlns:a14="http://schemas.microsoft.com/office/drawing/2010/main">
+                <a:solidFill>
+                  <a:schemeClr val="accent1"/>
+                </a:solidFill>
+              </a14:hiddenFill>
+            </a:ext>
+            <a:ext uri="{91240B29-F687-4F45-9708-019B960494DF}">
+              <a14:hiddenLine xmlns:a14="http://schemas.microsoft.com/office/drawing/2010/main" w="9525">
+                <a:solidFill>
+                  <a:schemeClr val="tx1"/>
+                </a:solidFill>
+                <a:miter lim="800000"/>
+                <a:headEnd/>
+                <a:tailEnd/>
+              </a14:hiddenLine>
+            </a:ext>
+            <a:ext uri="{AF507438-7753-43E0-B8FC-AC1667EBCBE1}">
+              <a14:hiddenEffects xmlns:a14="http://schemas.microsoft.com/office/drawing/2010/main">
+                <a:effectLst>
+                  <a:outerShdw dist="35921" dir="2700000" algn="ctr" rotWithShape="0">
+                    <a:schemeClr val="bg2"/>
+                  </a:outerShdw>
+                </a:effectLst>
+              </a14:hiddenEffects>
+            </a:ext>
+          </a:extLst>
+        </p:spPr>
+      </p:pic>
+    </p:spTree>
+    <p:extLst>
+      <p:ext uri="{BB962C8B-B14F-4D97-AF65-F5344CB8AC3E}">
+        <p14:creationId xmlns:p14="http://schemas.microsoft.com/office/powerpoint/2010/main" val="1721159771"/>
+      </p:ext>
+    </p:extLst>
+  </p:cSld>
+  <p:clrMapOvr>
+    <a:masterClrMapping/>
+  </p:clrMapOvr>
+  <p:timing>
+    <p:tnLst>
+      <p:par>
+        <p:cTn id="1" dur="indefinite" restart="never" nodeType="tmRoot"/>
+      </p:par>
+    </p:tnLst>
+  </p:timing>
+</p:sld>
+</file>
+
+<file path=ppt/slides/slide11.xml><?xml version="1.0" encoding="utf-8"?>
 <p:sld xmlns:a="http://schemas.openxmlformats.org/drawingml/2006/main" xmlns:r="http://schemas.openxmlformats.org/officeDocument/2006/relationships" xmlns:p="http://schemas.openxmlformats.org/presentationml/2006/main">
   <p:cSld>
     <p:spTree>
@@ -14740,7 +14856,453 @@
           <p:cNvPr id="2" name="Title 1">
             <a:extLst>
               <a:ext uri="{FF2B5EF4-FFF2-40B4-BE49-F238E27FC236}">
-                <a16:creationId xmlns:a16="http://schemas.microsoft.com/office/drawing/2014/main" xmlns="" id="{2869A272-1A93-448C-881A-37FF6FCC526A}"/>
+                <a16:creationId xmlns="" xmlns:a16="http://schemas.microsoft.com/office/drawing/2014/main" id="{14E6FFD6-066D-47FB-ACD0-46128944E1DC}"/>
+              </a:ext>
+            </a:extLst>
+          </p:cNvPr>
+          <p:cNvSpPr>
+            <a:spLocks noGrp="1"/>
+          </p:cNvSpPr>
+          <p:nvPr>
+            <p:ph type="title"/>
+          </p:nvPr>
+        </p:nvSpPr>
+        <p:spPr/>
+        <p:txBody>
+          <a:bodyPr/>
+          <a:lstStyle/>
+          <a:p>
+            <a:r>
+              <a:rPr lang="en-US" dirty="0"/>
+              <a:t>XG Boost - Applications</a:t>
+            </a:r>
+            <a:endParaRPr lang="en-IN" dirty="0"/>
+          </a:p>
+        </p:txBody>
+      </p:sp>
+      <p:sp>
+        <p:nvSpPr>
+          <p:cNvPr id="6" name="Rectangle 3">
+            <a:extLst>
+              <a:ext uri="{FF2B5EF4-FFF2-40B4-BE49-F238E27FC236}">
+                <a16:creationId xmlns="" xmlns:a16="http://schemas.microsoft.com/office/drawing/2014/main" id="{8F2C95CB-A78D-44B6-B7F8-320CC6C8A0B7}"/>
+              </a:ext>
+            </a:extLst>
+          </p:cNvPr>
+          <p:cNvSpPr>
+            <a:spLocks noGrp="1" noChangeArrowheads="1"/>
+          </p:cNvSpPr>
+          <p:nvPr>
+            <p:ph idx="1"/>
+          </p:nvPr>
+        </p:nvSpPr>
+        <p:spPr bwMode="auto">
+          <a:xfrm>
+            <a:off x="381000" y="2438400"/>
+            <a:ext cx="7959612" cy="3970318"/>
+          </a:xfrm>
+          <a:prstGeom prst="rect">
+            <a:avLst/>
+          </a:prstGeom>
+          <a:noFill/>
+          <a:ln>
+            <a:noFill/>
+          </a:ln>
+          <a:effectLst/>
+          <a:extLst>
+            <a:ext uri="{909E8E84-426E-40DD-AFC4-6F175D3DCCD1}">
+              <a14:hiddenFill xmlns:a14="http://schemas.microsoft.com/office/drawing/2010/main">
+                <a:solidFill>
+                  <a:schemeClr val="accent1"/>
+                </a:solidFill>
+              </a14:hiddenFill>
+            </a:ext>
+            <a:ext uri="{91240B29-F687-4F45-9708-019B960494DF}">
+              <a14:hiddenLine xmlns:a14="http://schemas.microsoft.com/office/drawing/2010/main" w="9525">
+                <a:solidFill>
+                  <a:schemeClr val="tx1"/>
+                </a:solidFill>
+                <a:miter lim="800000"/>
+                <a:headEnd/>
+                <a:tailEnd/>
+              </a14:hiddenLine>
+            </a:ext>
+            <a:ext uri="{AF507438-7753-43E0-B8FC-AC1667EBCBE1}">
+              <a14:hiddenEffects xmlns:a14="http://schemas.microsoft.com/office/drawing/2010/main">
+                <a:effectLst>
+                  <a:outerShdw dist="35921" dir="2700000" algn="ctr" rotWithShape="0">
+                    <a:schemeClr val="bg2"/>
+                  </a:outerShdw>
+                </a:effectLst>
+              </a14:hiddenEffects>
+            </a:ext>
+          </a:extLst>
+        </p:spPr>
+        <p:txBody>
+          <a:bodyPr vert="horz" wrap="square" lIns="91440" tIns="45720" rIns="91440" bIns="45720" numCol="1" anchor="ctr" anchorCtr="0" compatLnSpc="1">
+            <a:prstTxWarp prst="textNoShape">
+              <a:avLst/>
+            </a:prstTxWarp>
+            <a:spAutoFit/>
+          </a:bodyPr>
+          <a:lstStyle/>
+          <a:p>
+            <a:pPr marL="0" marR="0" lvl="0" indent="0" algn="l" defTabSz="914400" rtl="0" eaLnBrk="0" fontAlgn="base" latinLnBrk="0" hangingPunct="0">
+              <a:lnSpc>
+                <a:spcPct val="100000"/>
+              </a:lnSpc>
+              <a:spcBef>
+                <a:spcPct val="0"/>
+              </a:spcBef>
+              <a:spcAft>
+                <a:spcPct val="0"/>
+              </a:spcAft>
+              <a:buClrTx/>
+              <a:buSzTx/>
+              <a:buNone/>
+              <a:tabLst/>
+            </a:pPr>
+            <a:r>
+              <a:rPr kumimoji="0" lang="en-US" altLang="en-US" sz="1800" b="1" i="0" u="none" strike="noStrike" cap="none" normalizeH="0" baseline="0" dirty="0">
+                <a:ln>
+                  <a:noFill/>
+                </a:ln>
+                <a:solidFill>
+                  <a:schemeClr val="tx1"/>
+                </a:solidFill>
+                <a:effectLst/>
+              </a:rPr>
+              <a:t>Finance:</a:t>
+            </a:r>
+            <a:r>
+              <a:rPr kumimoji="0" lang="en-US" altLang="en-US" sz="1800" b="0" i="0" u="none" strike="noStrike" cap="none" normalizeH="0" baseline="0" dirty="0">
+                <a:ln>
+                  <a:noFill/>
+                </a:ln>
+                <a:solidFill>
+                  <a:schemeClr val="tx1"/>
+                </a:solidFill>
+                <a:effectLst/>
+              </a:rPr>
+              <a:t> Widely used in predicting stock prices, credit scoring, and detecting fraudulent transactions.</a:t>
+            </a:r>
+          </a:p>
+          <a:p>
+            <a:pPr marL="0" marR="0" lvl="0" indent="0" algn="l" defTabSz="914400" rtl="0" eaLnBrk="0" fontAlgn="base" latinLnBrk="0" hangingPunct="0">
+              <a:lnSpc>
+                <a:spcPct val="100000"/>
+              </a:lnSpc>
+              <a:spcBef>
+                <a:spcPct val="0"/>
+              </a:spcBef>
+              <a:spcAft>
+                <a:spcPct val="0"/>
+              </a:spcAft>
+              <a:buClrTx/>
+              <a:buSzTx/>
+              <a:buNone/>
+              <a:tabLst/>
+            </a:pPr>
+            <a:endParaRPr kumimoji="0" lang="en-US" altLang="en-US" sz="1800" b="0" i="0" u="none" strike="noStrike" cap="none" normalizeH="0" baseline="0" dirty="0">
+              <a:ln>
+                <a:noFill/>
+              </a:ln>
+              <a:solidFill>
+                <a:schemeClr val="tx1"/>
+              </a:solidFill>
+              <a:effectLst/>
+            </a:endParaRPr>
+          </a:p>
+          <a:p>
+            <a:pPr marL="0" marR="0" lvl="0" indent="0" algn="l" defTabSz="914400" rtl="0" eaLnBrk="0" fontAlgn="base" latinLnBrk="0" hangingPunct="0">
+              <a:lnSpc>
+                <a:spcPct val="100000"/>
+              </a:lnSpc>
+              <a:spcBef>
+                <a:spcPct val="0"/>
+              </a:spcBef>
+              <a:spcAft>
+                <a:spcPct val="0"/>
+              </a:spcAft>
+              <a:buClrTx/>
+              <a:buSzTx/>
+              <a:buNone/>
+              <a:tabLst/>
+            </a:pPr>
+            <a:r>
+              <a:rPr kumimoji="0" lang="en-US" altLang="en-US" sz="1800" b="1" i="0" u="none" strike="noStrike" cap="none" normalizeH="0" baseline="0" dirty="0">
+                <a:ln>
+                  <a:noFill/>
+                </a:ln>
+                <a:solidFill>
+                  <a:schemeClr val="tx1"/>
+                </a:solidFill>
+                <a:effectLst/>
+              </a:rPr>
+              <a:t>Healthcare:</a:t>
+            </a:r>
+            <a:r>
+              <a:rPr kumimoji="0" lang="en-US" altLang="en-US" sz="1800" b="0" i="0" u="none" strike="noStrike" cap="none" normalizeH="0" baseline="0" dirty="0">
+                <a:ln>
+                  <a:noFill/>
+                </a:ln>
+                <a:solidFill>
+                  <a:schemeClr val="tx1"/>
+                </a:solidFill>
+                <a:effectLst/>
+              </a:rPr>
+              <a:t> Applied in disease prediction, patient outcome forecasting, and medical image analysis.</a:t>
+            </a:r>
+          </a:p>
+          <a:p>
+            <a:pPr marL="0" marR="0" lvl="0" indent="0" algn="l" defTabSz="914400" rtl="0" eaLnBrk="0" fontAlgn="base" latinLnBrk="0" hangingPunct="0">
+              <a:lnSpc>
+                <a:spcPct val="100000"/>
+              </a:lnSpc>
+              <a:spcBef>
+                <a:spcPct val="0"/>
+              </a:spcBef>
+              <a:spcAft>
+                <a:spcPct val="0"/>
+              </a:spcAft>
+              <a:buClrTx/>
+              <a:buSzTx/>
+              <a:buFontTx/>
+              <a:buChar char="•"/>
+              <a:tabLst/>
+            </a:pPr>
+            <a:endParaRPr kumimoji="0" lang="en-US" altLang="en-US" sz="1800" b="0" i="0" u="none" strike="noStrike" cap="none" normalizeH="0" baseline="0" dirty="0">
+              <a:ln>
+                <a:noFill/>
+              </a:ln>
+              <a:solidFill>
+                <a:schemeClr val="tx1"/>
+              </a:solidFill>
+              <a:effectLst/>
+            </a:endParaRPr>
+          </a:p>
+          <a:p>
+            <a:pPr marL="0" marR="0" lvl="0" indent="0" algn="l" defTabSz="914400" rtl="0" eaLnBrk="0" fontAlgn="base" latinLnBrk="0" hangingPunct="0">
+              <a:lnSpc>
+                <a:spcPct val="100000"/>
+              </a:lnSpc>
+              <a:spcBef>
+                <a:spcPct val="0"/>
+              </a:spcBef>
+              <a:spcAft>
+                <a:spcPct val="0"/>
+              </a:spcAft>
+              <a:buClrTx/>
+              <a:buSzTx/>
+              <a:buNone/>
+              <a:tabLst/>
+            </a:pPr>
+            <a:r>
+              <a:rPr kumimoji="0" lang="en-US" altLang="en-US" sz="1800" b="1" i="0" u="none" strike="noStrike" cap="none" normalizeH="0" baseline="0" dirty="0">
+                <a:ln>
+                  <a:noFill/>
+                </a:ln>
+                <a:solidFill>
+                  <a:schemeClr val="tx1"/>
+                </a:solidFill>
+                <a:effectLst/>
+              </a:rPr>
+              <a:t>Marketing:</a:t>
+            </a:r>
+            <a:r>
+              <a:rPr kumimoji="0" lang="en-US" altLang="en-US" sz="1800" b="0" i="0" u="none" strike="noStrike" cap="none" normalizeH="0" baseline="0" dirty="0">
+                <a:ln>
+                  <a:noFill/>
+                </a:ln>
+                <a:solidFill>
+                  <a:schemeClr val="tx1"/>
+                </a:solidFill>
+                <a:effectLst/>
+              </a:rPr>
+              <a:t> Helps in customer segmentation, churn prediction, and personalized recommendation systems.</a:t>
+            </a:r>
+          </a:p>
+          <a:p>
+            <a:pPr marL="0" marR="0" lvl="0" indent="0" algn="l" defTabSz="914400" rtl="0" eaLnBrk="0" fontAlgn="base" latinLnBrk="0" hangingPunct="0">
+              <a:lnSpc>
+                <a:spcPct val="100000"/>
+              </a:lnSpc>
+              <a:spcBef>
+                <a:spcPct val="0"/>
+              </a:spcBef>
+              <a:spcAft>
+                <a:spcPct val="0"/>
+              </a:spcAft>
+              <a:buClrTx/>
+              <a:buSzTx/>
+              <a:buFontTx/>
+              <a:buChar char="•"/>
+              <a:tabLst/>
+            </a:pPr>
+            <a:endParaRPr kumimoji="0" lang="en-US" altLang="en-US" sz="1800" b="0" i="0" u="none" strike="noStrike" cap="none" normalizeH="0" baseline="0" dirty="0">
+              <a:ln>
+                <a:noFill/>
+              </a:ln>
+              <a:solidFill>
+                <a:schemeClr val="tx1"/>
+              </a:solidFill>
+              <a:effectLst/>
+            </a:endParaRPr>
+          </a:p>
+          <a:p>
+            <a:pPr marL="0" marR="0" lvl="0" indent="0" algn="l" defTabSz="914400" rtl="0" eaLnBrk="0" fontAlgn="base" latinLnBrk="0" hangingPunct="0">
+              <a:lnSpc>
+                <a:spcPct val="100000"/>
+              </a:lnSpc>
+              <a:spcBef>
+                <a:spcPct val="0"/>
+              </a:spcBef>
+              <a:spcAft>
+                <a:spcPct val="0"/>
+              </a:spcAft>
+              <a:buClrTx/>
+              <a:buSzTx/>
+              <a:buNone/>
+              <a:tabLst/>
+            </a:pPr>
+            <a:r>
+              <a:rPr kumimoji="0" lang="en-US" altLang="en-US" sz="1800" b="1" i="0" u="none" strike="noStrike" cap="none" normalizeH="0" baseline="0" dirty="0">
+                <a:ln>
+                  <a:noFill/>
+                </a:ln>
+                <a:solidFill>
+                  <a:schemeClr val="tx1"/>
+                </a:solidFill>
+                <a:effectLst/>
+              </a:rPr>
+              <a:t>Competition Success:</a:t>
+            </a:r>
+            <a:r>
+              <a:rPr kumimoji="0" lang="en-US" altLang="en-US" sz="1800" b="0" i="0" u="none" strike="noStrike" cap="none" normalizeH="0" baseline="0" dirty="0">
+                <a:ln>
+                  <a:noFill/>
+                </a:ln>
+                <a:solidFill>
+                  <a:schemeClr val="tx1"/>
+                </a:solidFill>
+                <a:effectLst/>
+              </a:rPr>
+              <a:t> Frequently used by data scientists to win machine learning competitions on platforms like Kaggle.</a:t>
+            </a:r>
+          </a:p>
+          <a:p>
+            <a:pPr marL="0" marR="0" lvl="0" indent="0" algn="l" defTabSz="914400" rtl="0" eaLnBrk="0" fontAlgn="base" latinLnBrk="0" hangingPunct="0">
+              <a:lnSpc>
+                <a:spcPct val="100000"/>
+              </a:lnSpc>
+              <a:spcBef>
+                <a:spcPct val="0"/>
+              </a:spcBef>
+              <a:spcAft>
+                <a:spcPct val="0"/>
+              </a:spcAft>
+              <a:buClrTx/>
+              <a:buSzTx/>
+              <a:buFontTx/>
+              <a:buChar char="•"/>
+              <a:tabLst/>
+            </a:pPr>
+            <a:endParaRPr kumimoji="0" lang="en-US" altLang="en-US" sz="1800" b="0" i="0" u="none" strike="noStrike" cap="none" normalizeH="0" baseline="0" dirty="0">
+              <a:ln>
+                <a:noFill/>
+              </a:ln>
+              <a:solidFill>
+                <a:schemeClr val="tx1"/>
+              </a:solidFill>
+              <a:effectLst/>
+            </a:endParaRPr>
+          </a:p>
+          <a:p>
+            <a:pPr marL="0" marR="0" lvl="0" indent="0" algn="l" defTabSz="914400" rtl="0" eaLnBrk="0" fontAlgn="base" latinLnBrk="0" hangingPunct="0">
+              <a:lnSpc>
+                <a:spcPct val="100000"/>
+              </a:lnSpc>
+              <a:spcBef>
+                <a:spcPct val="0"/>
+              </a:spcBef>
+              <a:spcAft>
+                <a:spcPct val="0"/>
+              </a:spcAft>
+              <a:buClrTx/>
+              <a:buSzTx/>
+              <a:buNone/>
+              <a:tabLst/>
+            </a:pPr>
+            <a:r>
+              <a:rPr kumimoji="0" lang="en-US" altLang="en-US" sz="1800" b="1" i="0" u="none" strike="noStrike" cap="none" normalizeH="0" baseline="0" dirty="0">
+                <a:ln>
+                  <a:noFill/>
+                </a:ln>
+                <a:solidFill>
+                  <a:schemeClr val="tx1"/>
+                </a:solidFill>
+                <a:effectLst/>
+              </a:rPr>
+              <a:t>Retail:</a:t>
+            </a:r>
+            <a:r>
+              <a:rPr kumimoji="0" lang="en-US" altLang="en-US" sz="1800" b="0" i="0" u="none" strike="noStrike" cap="none" normalizeH="0" baseline="0" dirty="0">
+                <a:ln>
+                  <a:noFill/>
+                </a:ln>
+                <a:solidFill>
+                  <a:schemeClr val="tx1"/>
+                </a:solidFill>
+                <a:effectLst/>
+              </a:rPr>
+              <a:t> Used in demand forecasting, inventory management, and optimizing supply chain processes. </a:t>
+            </a:r>
+          </a:p>
+        </p:txBody>
+      </p:sp>
+    </p:spTree>
+    <p:extLst>
+      <p:ext uri="{BB962C8B-B14F-4D97-AF65-F5344CB8AC3E}">
+        <p14:creationId xmlns:p14="http://schemas.microsoft.com/office/powerpoint/2010/main" val="1203277047"/>
+      </p:ext>
+    </p:extLst>
+  </p:cSld>
+  <p:clrMapOvr>
+    <a:masterClrMapping/>
+  </p:clrMapOvr>
+  <p:timing>
+    <p:tnLst>
+      <p:par>
+        <p:cTn id="1" dur="indefinite" restart="never" nodeType="tmRoot"/>
+      </p:par>
+    </p:tnLst>
+  </p:timing>
+</p:sld>
+</file>
+
+<file path=ppt/slides/slide12.xml><?xml version="1.0" encoding="utf-8"?>
+<p:sld xmlns:a="http://schemas.openxmlformats.org/drawingml/2006/main" xmlns:r="http://schemas.openxmlformats.org/officeDocument/2006/relationships" xmlns:p="http://schemas.openxmlformats.org/presentationml/2006/main">
+  <p:cSld>
+    <p:spTree>
+      <p:nvGrpSpPr>
+        <p:cNvPr id="1" name=""/>
+        <p:cNvGrpSpPr/>
+        <p:nvPr/>
+      </p:nvGrpSpPr>
+      <p:grpSpPr>
+        <a:xfrm>
+          <a:off x="0" y="0"/>
+          <a:ext cx="0" cy="0"/>
+          <a:chOff x="0" y="0"/>
+          <a:chExt cx="0" cy="0"/>
+        </a:xfrm>
+      </p:grpSpPr>
+      <p:sp>
+        <p:nvSpPr>
+          <p:cNvPr id="2" name="Title 1">
+            <a:extLst>
+              <a:ext uri="{FF2B5EF4-FFF2-40B4-BE49-F238E27FC236}">
+                <a16:creationId xmlns="" xmlns:a16="http://schemas.microsoft.com/office/drawing/2014/main" id="{2869A272-1A93-448C-881A-37FF6FCC526A}"/>
               </a:ext>
             </a:extLst>
           </p:cNvPr>
@@ -14770,7 +15332,7 @@
           <p:cNvPr id="4" name="Rectangle 2">
             <a:extLst>
               <a:ext uri="{FF2B5EF4-FFF2-40B4-BE49-F238E27FC236}">
-                <a16:creationId xmlns:a16="http://schemas.microsoft.com/office/drawing/2014/main" xmlns="" id="{DCB898D1-18EE-4F13-B9F0-560729A88864}"/>
+                <a16:creationId xmlns="" xmlns:a16="http://schemas.microsoft.com/office/drawing/2014/main" id="{DCB898D1-18EE-4F13-B9F0-560729A88864}"/>
               </a:ext>
             </a:extLst>
           </p:cNvPr>
@@ -15478,7 +16040,7 @@
 </p:sld>
 </file>
 
-<file path=ppt/slides/slide11.xml><?xml version="1.0" encoding="utf-8"?>
+<file path=ppt/slides/slide13.xml><?xml version="1.0" encoding="utf-8"?>
 <p:sld xmlns:a="http://schemas.openxmlformats.org/drawingml/2006/main" xmlns:r="http://schemas.openxmlformats.org/officeDocument/2006/relationships" xmlns:p="http://schemas.openxmlformats.org/presentationml/2006/main">
   <p:cSld>
     <p:spTree>
@@ -15500,7 +16062,7 @@
           <p:cNvPr id="2" name="Title 1">
             <a:extLst>
               <a:ext uri="{FF2B5EF4-FFF2-40B4-BE49-F238E27FC236}">
-                <a16:creationId xmlns:a16="http://schemas.microsoft.com/office/drawing/2014/main" xmlns="" id="{622FFE3B-A83B-4448-8D72-D3159FE851BB}"/>
+                <a16:creationId xmlns="" xmlns:a16="http://schemas.microsoft.com/office/drawing/2014/main" id="{622FFE3B-A83B-4448-8D72-D3159FE851BB}"/>
               </a:ext>
             </a:extLst>
           </p:cNvPr>
@@ -15529,7 +16091,7 @@
           <p:cNvPr id="4" name="Rectangle 1">
             <a:extLst>
               <a:ext uri="{FF2B5EF4-FFF2-40B4-BE49-F238E27FC236}">
-                <a16:creationId xmlns:a16="http://schemas.microsoft.com/office/drawing/2014/main" xmlns="" id="{D31F637A-EE45-4FE2-AE95-0D4FCEE90FE1}"/>
+                <a16:creationId xmlns="" xmlns:a16="http://schemas.microsoft.com/office/drawing/2014/main" id="{D31F637A-EE45-4FE2-AE95-0D4FCEE90FE1}"/>
               </a:ext>
             </a:extLst>
           </p:cNvPr>
@@ -15995,7 +16557,231 @@
 </p:sld>
 </file>
 
-<file path=ppt/slides/slide12.xml><?xml version="1.0" encoding="utf-8"?>
+<file path=ppt/slides/slide14.xml><?xml version="1.0" encoding="utf-8"?>
+<p:sld xmlns:a="http://schemas.openxmlformats.org/drawingml/2006/main" xmlns:r="http://schemas.openxmlformats.org/officeDocument/2006/relationships" xmlns:p="http://schemas.openxmlformats.org/presentationml/2006/main">
+  <p:cSld>
+    <p:spTree>
+      <p:nvGrpSpPr>
+        <p:cNvPr id="1" name=""/>
+        <p:cNvGrpSpPr/>
+        <p:nvPr/>
+      </p:nvGrpSpPr>
+      <p:grpSpPr>
+        <a:xfrm>
+          <a:off x="0" y="0"/>
+          <a:ext cx="0" cy="0"/>
+          <a:chOff x="0" y="0"/>
+          <a:chExt cx="0" cy="0"/>
+        </a:xfrm>
+      </p:grpSpPr>
+      <p:sp>
+        <p:nvSpPr>
+          <p:cNvPr id="2" name="Rectangle 1"/>
+          <p:cNvSpPr/>
+          <p:nvPr/>
+        </p:nvSpPr>
+        <p:spPr>
+          <a:xfrm>
+            <a:off x="674077" y="3200400"/>
+            <a:ext cx="8458200" cy="1477328"/>
+          </a:xfrm>
+          <a:prstGeom prst="rect">
+            <a:avLst/>
+          </a:prstGeom>
+        </p:spPr>
+        <p:txBody>
+          <a:bodyPr wrap="square">
+            <a:spAutoFit/>
+          </a:bodyPr>
+          <a:lstStyle/>
+          <a:p>
+            <a:r>
+              <a:rPr lang="en-US" dirty="0"/>
+              <a:t>"LG Boosting" refers to the "Light Gradient Boosting Machine" algorithm, </a:t>
+            </a:r>
+            <a:endParaRPr lang="en-US" dirty="0" smtClean="0"/>
+          </a:p>
+          <a:p>
+            <a:r>
+              <a:rPr lang="en-US" dirty="0" smtClean="0"/>
+              <a:t>which </a:t>
+            </a:r>
+            <a:r>
+              <a:rPr lang="en-US" dirty="0"/>
+              <a:t>is </a:t>
+            </a:r>
+            <a:r>
+              <a:rPr lang="en-US" dirty="0"/>
+              <a:t>a type of machine learning technique that combines multiple </a:t>
+            </a:r>
+            <a:endParaRPr lang="en-US" dirty="0" smtClean="0"/>
+          </a:p>
+          <a:p>
+            <a:r>
+              <a:rPr lang="en-US" dirty="0" smtClean="0"/>
+              <a:t>weak </a:t>
+            </a:r>
+            <a:r>
+              <a:rPr lang="en-US" dirty="0"/>
+              <a:t>prediction models (like small decision trees) to create a stronger, </a:t>
+            </a:r>
+            <a:endParaRPr lang="en-US" dirty="0" smtClean="0"/>
+          </a:p>
+          <a:p>
+            <a:r>
+              <a:rPr lang="en-US" dirty="0" smtClean="0"/>
+              <a:t>more </a:t>
+            </a:r>
+            <a:r>
+              <a:rPr lang="en-US" dirty="0"/>
+              <a:t>accurate prediction model by sequentially adding new trees that focus on correcting the errors of the previous ones</a:t>
+            </a:r>
+            <a:r>
+              <a:rPr lang="en-US" dirty="0"/>
+              <a:t>,</a:t>
+            </a:r>
+            <a:endParaRPr lang="en-IN" dirty="0"/>
+          </a:p>
+        </p:txBody>
+      </p:sp>
+      <p:sp>
+        <p:nvSpPr>
+          <p:cNvPr id="3" name="TextBox 2"/>
+          <p:cNvSpPr txBox="1"/>
+          <p:nvPr/>
+        </p:nvSpPr>
+        <p:spPr>
+          <a:xfrm>
+            <a:off x="1981200" y="1828800"/>
+            <a:ext cx="1462260" cy="369332"/>
+          </a:xfrm>
+          <a:prstGeom prst="rect">
+            <a:avLst/>
+          </a:prstGeom>
+          <a:noFill/>
+        </p:spPr>
+        <p:txBody>
+          <a:bodyPr wrap="none" rtlCol="0">
+            <a:spAutoFit/>
+          </a:bodyPr>
+          <a:lstStyle/>
+          <a:p>
+            <a:r>
+              <a:rPr lang="en-IN" dirty="0" smtClean="0"/>
+              <a:t>Simple word:</a:t>
+            </a:r>
+            <a:endParaRPr lang="en-IN" dirty="0"/>
+          </a:p>
+        </p:txBody>
+      </p:sp>
+    </p:spTree>
+    <p:extLst>
+      <p:ext uri="{BB962C8B-B14F-4D97-AF65-F5344CB8AC3E}">
+        <p14:creationId xmlns:p14="http://schemas.microsoft.com/office/powerpoint/2010/main" val="2560361959"/>
+      </p:ext>
+    </p:extLst>
+  </p:cSld>
+  <p:clrMapOvr>
+    <a:masterClrMapping/>
+  </p:clrMapOvr>
+</p:sld>
+</file>
+
+<file path=ppt/slides/slide15.xml><?xml version="1.0" encoding="utf-8"?>
+<p:sld xmlns:a="http://schemas.openxmlformats.org/drawingml/2006/main" xmlns:r="http://schemas.openxmlformats.org/officeDocument/2006/relationships" xmlns:p="http://schemas.openxmlformats.org/presentationml/2006/main">
+  <p:cSld>
+    <p:spTree>
+      <p:nvGrpSpPr>
+        <p:cNvPr id="1" name=""/>
+        <p:cNvGrpSpPr/>
+        <p:nvPr/>
+      </p:nvGrpSpPr>
+      <p:grpSpPr>
+        <a:xfrm>
+          <a:off x="0" y="0"/>
+          <a:ext cx="0" cy="0"/>
+          <a:chOff x="0" y="0"/>
+          <a:chExt cx="0" cy="0"/>
+        </a:xfrm>
+      </p:grpSpPr>
+      <p:pic>
+        <p:nvPicPr>
+          <p:cNvPr id="2050" name="Picture 2"/>
+          <p:cNvPicPr>
+            <a:picLocks noChangeAspect="1" noChangeArrowheads="1"/>
+          </p:cNvPicPr>
+          <p:nvPr/>
+        </p:nvPicPr>
+        <p:blipFill>
+          <a:blip r:embed="rId2">
+            <a:extLst>
+              <a:ext uri="{28A0092B-C50C-407E-A947-70E740481C1C}">
+                <a14:useLocalDpi xmlns:a14="http://schemas.microsoft.com/office/drawing/2010/main" val="0"/>
+              </a:ext>
+            </a:extLst>
+          </a:blip>
+          <a:srcRect/>
+          <a:stretch>
+            <a:fillRect/>
+          </a:stretch>
+        </p:blipFill>
+        <p:spPr bwMode="auto">
+          <a:xfrm>
+            <a:off x="1687513" y="1485900"/>
+            <a:ext cx="5768975" cy="3886200"/>
+          </a:xfrm>
+          <a:prstGeom prst="rect">
+            <a:avLst/>
+          </a:prstGeom>
+          <a:noFill/>
+          <a:ln>
+            <a:noFill/>
+          </a:ln>
+          <a:effectLst/>
+          <a:extLst>
+            <a:ext uri="{909E8E84-426E-40DD-AFC4-6F175D3DCCD1}">
+              <a14:hiddenFill xmlns:a14="http://schemas.microsoft.com/office/drawing/2010/main">
+                <a:solidFill>
+                  <a:schemeClr val="accent1"/>
+                </a:solidFill>
+              </a14:hiddenFill>
+            </a:ext>
+            <a:ext uri="{91240B29-F687-4F45-9708-019B960494DF}">
+              <a14:hiddenLine xmlns:a14="http://schemas.microsoft.com/office/drawing/2010/main" w="9525">
+                <a:solidFill>
+                  <a:schemeClr val="tx1"/>
+                </a:solidFill>
+                <a:miter lim="800000"/>
+                <a:headEnd/>
+                <a:tailEnd/>
+              </a14:hiddenLine>
+            </a:ext>
+            <a:ext uri="{AF507438-7753-43E0-B8FC-AC1667EBCBE1}">
+              <a14:hiddenEffects xmlns:a14="http://schemas.microsoft.com/office/drawing/2010/main">
+                <a:effectLst>
+                  <a:outerShdw dist="35921" dir="2700000" algn="ctr" rotWithShape="0">
+                    <a:schemeClr val="bg2"/>
+                  </a:outerShdw>
+                </a:effectLst>
+              </a14:hiddenEffects>
+            </a:ext>
+          </a:extLst>
+        </p:spPr>
+      </p:pic>
+    </p:spTree>
+    <p:extLst>
+      <p:ext uri="{BB962C8B-B14F-4D97-AF65-F5344CB8AC3E}">
+        <p14:creationId xmlns:p14="http://schemas.microsoft.com/office/powerpoint/2010/main" val="2037880773"/>
+      </p:ext>
+    </p:extLst>
+  </p:cSld>
+  <p:clrMapOvr>
+    <a:masterClrMapping/>
+  </p:clrMapOvr>
+</p:sld>
+</file>
+
+<file path=ppt/slides/slide16.xml><?xml version="1.0" encoding="utf-8"?>
 <p:sld xmlns:a="http://schemas.openxmlformats.org/drawingml/2006/main" xmlns:r="http://schemas.openxmlformats.org/officeDocument/2006/relationships" xmlns:p="http://schemas.openxmlformats.org/presentationml/2006/main">
   <p:cSld>
     <p:spTree>
@@ -16017,7 +16803,7 @@
           <p:cNvPr id="2" name="Title 1">
             <a:extLst>
               <a:ext uri="{FF2B5EF4-FFF2-40B4-BE49-F238E27FC236}">
-                <a16:creationId xmlns:a16="http://schemas.microsoft.com/office/drawing/2014/main" xmlns="" id="{AC8F1679-8477-4A24-8AEB-C43E33E43846}"/>
+                <a16:creationId xmlns="" xmlns:a16="http://schemas.microsoft.com/office/drawing/2014/main" id="{AC8F1679-8477-4A24-8AEB-C43E33E43846}"/>
               </a:ext>
             </a:extLst>
           </p:cNvPr>
@@ -16046,7 +16832,7 @@
           <p:cNvPr id="5" name="Content Placeholder 4">
             <a:extLst>
               <a:ext uri="{FF2B5EF4-FFF2-40B4-BE49-F238E27FC236}">
-                <a16:creationId xmlns:a16="http://schemas.microsoft.com/office/drawing/2014/main" xmlns="" id="{00E338F7-6E23-480E-BFF2-3104E9F2A6E8}"/>
+                <a16:creationId xmlns="" xmlns:a16="http://schemas.microsoft.com/office/drawing/2014/main" id="{00E338F7-6E23-480E-BFF2-3104E9F2A6E8}"/>
               </a:ext>
             </a:extLst>
           </p:cNvPr>
@@ -16083,7 +16869,7 @@
 </p:sld>
 </file>
 
-<file path=ppt/slides/slide13.xml><?xml version="1.0" encoding="utf-8"?>
+<file path=ppt/slides/slide17.xml><?xml version="1.0" encoding="utf-8"?>
 <p:sld xmlns:a="http://schemas.openxmlformats.org/drawingml/2006/main" xmlns:r="http://schemas.openxmlformats.org/officeDocument/2006/relationships" xmlns:p="http://schemas.openxmlformats.org/presentationml/2006/main">
   <p:cSld>
     <p:spTree>
@@ -16105,7 +16891,7 @@
           <p:cNvPr id="2" name="Title 1">
             <a:extLst>
               <a:ext uri="{FF2B5EF4-FFF2-40B4-BE49-F238E27FC236}">
-                <a16:creationId xmlns:a16="http://schemas.microsoft.com/office/drawing/2014/main" xmlns="" id="{2869A272-1A93-448C-881A-37FF6FCC526A}"/>
+                <a16:creationId xmlns="" xmlns:a16="http://schemas.microsoft.com/office/drawing/2014/main" id="{2869A272-1A93-448C-881A-37FF6FCC526A}"/>
               </a:ext>
             </a:extLst>
           </p:cNvPr>
@@ -16135,7 +16921,7 @@
           <p:cNvPr id="5" name="Rectangle 2">
             <a:extLst>
               <a:ext uri="{FF2B5EF4-FFF2-40B4-BE49-F238E27FC236}">
-                <a16:creationId xmlns:a16="http://schemas.microsoft.com/office/drawing/2014/main" xmlns="" id="{68CBC021-F3A7-4656-909A-739927E7638B}"/>
+                <a16:creationId xmlns="" xmlns:a16="http://schemas.microsoft.com/office/drawing/2014/main" id="{68CBC021-F3A7-4656-909A-739927E7638B}"/>
               </a:ext>
             </a:extLst>
           </p:cNvPr>
@@ -17050,7 +17836,7 @@
 </p:sld>
 </file>
 
-<file path=ppt/slides/slide14.xml><?xml version="1.0" encoding="utf-8"?>
+<file path=ppt/slides/slide18.xml><?xml version="1.0" encoding="utf-8"?>
 <p:sld xmlns:a="http://schemas.openxmlformats.org/drawingml/2006/main" xmlns:r="http://schemas.openxmlformats.org/officeDocument/2006/relationships" xmlns:p="http://schemas.openxmlformats.org/presentationml/2006/main">
   <p:cSld>
     <p:spTree>
@@ -17072,7 +17858,7 @@
           <p:cNvPr id="2" name="Title 1">
             <a:extLst>
               <a:ext uri="{FF2B5EF4-FFF2-40B4-BE49-F238E27FC236}">
-                <a16:creationId xmlns:a16="http://schemas.microsoft.com/office/drawing/2014/main" xmlns="" id="{14E6FFD6-066D-47FB-ACD0-46128944E1DC}"/>
+                <a16:creationId xmlns="" xmlns:a16="http://schemas.microsoft.com/office/drawing/2014/main" id="{14E6FFD6-066D-47FB-ACD0-46128944E1DC}"/>
               </a:ext>
             </a:extLst>
           </p:cNvPr>
@@ -17101,7 +17887,7 @@
           <p:cNvPr id="4" name="Rectangle 2">
             <a:extLst>
               <a:ext uri="{FF2B5EF4-FFF2-40B4-BE49-F238E27FC236}">
-                <a16:creationId xmlns:a16="http://schemas.microsoft.com/office/drawing/2014/main" xmlns="" id="{7ABD8B7F-891F-4081-A131-497B45AD8472}"/>
+                <a16:creationId xmlns="" xmlns:a16="http://schemas.microsoft.com/office/drawing/2014/main" id="{7ABD8B7F-891F-4081-A131-497B45AD8472}"/>
               </a:ext>
             </a:extLst>
           </p:cNvPr>
@@ -17880,7 +18666,7 @@
           <p:cNvPr id="2" name="Title 1">
             <a:extLst>
               <a:ext uri="{FF2B5EF4-FFF2-40B4-BE49-F238E27FC236}">
-                <a16:creationId xmlns:a16="http://schemas.microsoft.com/office/drawing/2014/main" xmlns="" id="{F2E6C85B-48FF-426D-9FED-1C16B906D951}"/>
+                <a16:creationId xmlns="" xmlns:a16="http://schemas.microsoft.com/office/drawing/2014/main" id="{F2E6C85B-48FF-426D-9FED-1C16B906D951}"/>
               </a:ext>
             </a:extLst>
           </p:cNvPr>
@@ -17909,7 +18695,7 @@
           <p:cNvPr id="6" name="Rectangle 2">
             <a:extLst>
               <a:ext uri="{FF2B5EF4-FFF2-40B4-BE49-F238E27FC236}">
-                <a16:creationId xmlns:a16="http://schemas.microsoft.com/office/drawing/2014/main" xmlns="" id="{5125F306-1449-47B6-8BA3-188648B59FE1}"/>
+                <a16:creationId xmlns="" xmlns:a16="http://schemas.microsoft.com/office/drawing/2014/main" id="{5125F306-1449-47B6-8BA3-188648B59FE1}"/>
               </a:ext>
             </a:extLst>
           </p:cNvPr>
@@ -17922,8 +18708,8 @@
         </p:nvSpPr>
         <p:spPr bwMode="auto">
           <a:xfrm>
-            <a:off x="304800" y="2514600"/>
-            <a:ext cx="8191666" cy="3416320"/>
+            <a:off x="304800" y="1683604"/>
+            <a:ext cx="8191666" cy="5078313"/>
           </a:xfrm>
           <a:prstGeom prst="rect">
             <a:avLst/>
@@ -18063,8 +18849,192 @@
                   <a:schemeClr val="tx1"/>
                 </a:solidFill>
               </a:rPr>
-              <a:t>weights of misclassified points.</a:t>
-            </a:r>
+              <a:t>weights of misclassified points</a:t>
+            </a:r>
+            <a:r>
+              <a:rPr lang="en-US" sz="1800" dirty="0" smtClean="0">
+                <a:solidFill>
+                  <a:schemeClr val="tx1"/>
+                </a:solidFill>
+              </a:rPr>
+              <a:t>.</a:t>
+            </a:r>
+          </a:p>
+          <a:p>
+            <a:pPr marL="0" indent="0" eaLnBrk="0" fontAlgn="base" hangingPunct="0">
+              <a:lnSpc>
+                <a:spcPct val="100000"/>
+              </a:lnSpc>
+              <a:spcBef>
+                <a:spcPct val="0"/>
+              </a:spcBef>
+              <a:spcAft>
+                <a:spcPct val="0"/>
+              </a:spcAft>
+              <a:buClrTx/>
+              <a:buSzTx/>
+              <a:buNone/>
+            </a:pPr>
+            <a:endParaRPr lang="en-US" sz="1800" dirty="0">
+              <a:solidFill>
+                <a:schemeClr val="tx1"/>
+              </a:solidFill>
+            </a:endParaRPr>
+          </a:p>
+          <a:p>
+            <a:pPr marL="0" indent="0" eaLnBrk="0" fontAlgn="base" hangingPunct="0">
+              <a:spcBef>
+                <a:spcPct val="0"/>
+              </a:spcBef>
+              <a:spcAft>
+                <a:spcPct val="0"/>
+              </a:spcAft>
+              <a:buClrTx/>
+              <a:buSzTx/>
+              <a:buNone/>
+            </a:pPr>
+            <a:r>
+              <a:rPr lang="en-US" sz="1800" dirty="0" err="1">
+                <a:solidFill>
+                  <a:schemeClr val="tx1"/>
+                </a:solidFill>
+              </a:rPr>
+              <a:t>Def</a:t>
+            </a:r>
+            <a:r>
+              <a:rPr lang="en-US" sz="1800" dirty="0" smtClean="0">
+                <a:solidFill>
+                  <a:schemeClr val="tx1"/>
+                </a:solidFill>
+              </a:rPr>
+              <a:t>: Weak </a:t>
+            </a:r>
+            <a:r>
+              <a:rPr lang="en-US" sz="1800" dirty="0">
+                <a:solidFill>
+                  <a:schemeClr val="tx1"/>
+                </a:solidFill>
+              </a:rPr>
+              <a:t>learners:</a:t>
+            </a:r>
+          </a:p>
+          <a:p>
+            <a:pPr marL="0" indent="0" eaLnBrk="0" fontAlgn="base" hangingPunct="0">
+              <a:spcBef>
+                <a:spcPct val="0"/>
+              </a:spcBef>
+              <a:spcAft>
+                <a:spcPct val="0"/>
+              </a:spcAft>
+              <a:buClrTx/>
+              <a:buSzTx/>
+              <a:buNone/>
+            </a:pPr>
+            <a:r>
+              <a:rPr lang="en-US" sz="1800" dirty="0" err="1">
+                <a:solidFill>
+                  <a:schemeClr val="tx1"/>
+                </a:solidFill>
+              </a:rPr>
+              <a:t>AdaBoost</a:t>
+            </a:r>
+            <a:r>
+              <a:rPr lang="en-US" sz="1800" dirty="0">
+                <a:solidFill>
+                  <a:schemeClr val="tx1"/>
+                </a:solidFill>
+              </a:rPr>
+              <a:t> uses simple models called "weak learners" (like decision stumps) </a:t>
+            </a:r>
+            <a:endParaRPr lang="en-US" sz="1800" dirty="0">
+              <a:solidFill>
+                <a:schemeClr val="tx1"/>
+              </a:solidFill>
+            </a:endParaRPr>
+          </a:p>
+          <a:p>
+            <a:pPr marL="0" indent="0" eaLnBrk="0" fontAlgn="base" hangingPunct="0">
+              <a:spcBef>
+                <a:spcPct val="0"/>
+              </a:spcBef>
+              <a:spcAft>
+                <a:spcPct val="0"/>
+              </a:spcAft>
+              <a:buClrTx/>
+              <a:buSzTx/>
+              <a:buNone/>
+            </a:pPr>
+            <a:r>
+              <a:rPr lang="en-US" sz="1800" dirty="0">
+                <a:solidFill>
+                  <a:schemeClr val="tx1"/>
+                </a:solidFill>
+              </a:rPr>
+              <a:t>which </a:t>
+            </a:r>
+            <a:r>
+              <a:rPr lang="en-US" sz="1800" dirty="0">
+                <a:solidFill>
+                  <a:schemeClr val="tx1"/>
+                </a:solidFill>
+              </a:rPr>
+              <a:t>are individually not very accurate, but when combined together, </a:t>
+            </a:r>
+            <a:endParaRPr lang="en-US" sz="1800" dirty="0">
+              <a:solidFill>
+                <a:schemeClr val="tx1"/>
+              </a:solidFill>
+            </a:endParaRPr>
+          </a:p>
+          <a:p>
+            <a:pPr marL="0" indent="0" eaLnBrk="0" fontAlgn="base" hangingPunct="0">
+              <a:spcBef>
+                <a:spcPct val="0"/>
+              </a:spcBef>
+              <a:spcAft>
+                <a:spcPct val="0"/>
+              </a:spcAft>
+              <a:buClrTx/>
+              <a:buSzTx/>
+              <a:buNone/>
+            </a:pPr>
+            <a:r>
+              <a:rPr lang="en-US" sz="1800" dirty="0">
+                <a:solidFill>
+                  <a:schemeClr val="tx1"/>
+                </a:solidFill>
+              </a:rPr>
+              <a:t>they </a:t>
+            </a:r>
+            <a:r>
+              <a:rPr lang="en-US" sz="1800" dirty="0">
+                <a:solidFill>
+                  <a:schemeClr val="tx1"/>
+                </a:solidFill>
+              </a:rPr>
+              <a:t>can create a strong learner. </a:t>
+            </a:r>
+          </a:p>
+          <a:p>
+            <a:pPr marL="0" indent="0" eaLnBrk="0" fontAlgn="base" hangingPunct="0">
+              <a:lnSpc>
+                <a:spcPct val="100000"/>
+              </a:lnSpc>
+              <a:spcBef>
+                <a:spcPct val="0"/>
+              </a:spcBef>
+              <a:spcAft>
+                <a:spcPct val="0"/>
+              </a:spcAft>
+              <a:buClrTx/>
+              <a:buSzTx/>
+              <a:buNone/>
+            </a:pPr>
+            <a:endParaRPr lang="en-US" sz="1800" dirty="0">
+              <a:solidFill>
+                <a:schemeClr val="tx1"/>
+              </a:solidFill>
+            </a:endParaRPr>
           </a:p>
           <a:p>
             <a:pPr marL="0" marR="0" lvl="0" indent="0" algn="l" defTabSz="914400" rtl="0" eaLnBrk="0" fontAlgn="base" latinLnBrk="0" hangingPunct="0">
@@ -18387,7 +19357,7 @@
           <p:cNvPr id="2" name="Title 1">
             <a:extLst>
               <a:ext uri="{FF2B5EF4-FFF2-40B4-BE49-F238E27FC236}">
-                <a16:creationId xmlns:a16="http://schemas.microsoft.com/office/drawing/2014/main" xmlns="" id="{F2E6C85B-48FF-426D-9FED-1C16B906D951}"/>
+                <a16:creationId xmlns="" xmlns:a16="http://schemas.microsoft.com/office/drawing/2014/main" id="{F2E6C85B-48FF-426D-9FED-1C16B906D951}"/>
               </a:ext>
             </a:extLst>
           </p:cNvPr>
@@ -18416,7 +19386,7 @@
           <p:cNvPr id="5" name="Picture 4">
             <a:extLst>
               <a:ext uri="{FF2B5EF4-FFF2-40B4-BE49-F238E27FC236}">
-                <a16:creationId xmlns:a16="http://schemas.microsoft.com/office/drawing/2014/main" xmlns="" id="{3F116B8D-AE1B-45D1-B7C0-183B5D0BDC2D}"/>
+                <a16:creationId xmlns="" xmlns:a16="http://schemas.microsoft.com/office/drawing/2014/main" id="{3F116B8D-AE1B-45D1-B7C0-183B5D0BDC2D}"/>
               </a:ext>
             </a:extLst>
           </p:cNvPr>
@@ -18483,7 +19453,7 @@
           <p:cNvPr id="2" name="Title 1">
             <a:extLst>
               <a:ext uri="{FF2B5EF4-FFF2-40B4-BE49-F238E27FC236}">
-                <a16:creationId xmlns:a16="http://schemas.microsoft.com/office/drawing/2014/main" xmlns="" id="{2869A272-1A93-448C-881A-37FF6FCC526A}"/>
+                <a16:creationId xmlns="" xmlns:a16="http://schemas.microsoft.com/office/drawing/2014/main" id="{2869A272-1A93-448C-881A-37FF6FCC526A}"/>
               </a:ext>
             </a:extLst>
           </p:cNvPr>
@@ -18513,7 +19483,7 @@
           <p:cNvPr id="5" name="Rectangle 2">
             <a:extLst>
               <a:ext uri="{FF2B5EF4-FFF2-40B4-BE49-F238E27FC236}">
-                <a16:creationId xmlns:a16="http://schemas.microsoft.com/office/drawing/2014/main" xmlns="" id="{01DEB7D5-206E-462D-A830-11E6B9BFA8E7}"/>
+                <a16:creationId xmlns="" xmlns:a16="http://schemas.microsoft.com/office/drawing/2014/main" id="{01DEB7D5-206E-462D-A830-11E6B9BFA8E7}"/>
               </a:ext>
             </a:extLst>
           </p:cNvPr>
@@ -19205,7 +20175,7 @@
           <p:cNvPr id="2" name="Title 1">
             <a:extLst>
               <a:ext uri="{FF2B5EF4-FFF2-40B4-BE49-F238E27FC236}">
-                <a16:creationId xmlns:a16="http://schemas.microsoft.com/office/drawing/2014/main" xmlns="" id="{14E6FFD6-066D-47FB-ACD0-46128944E1DC}"/>
+                <a16:creationId xmlns="" xmlns:a16="http://schemas.microsoft.com/office/drawing/2014/main" id="{14E6FFD6-066D-47FB-ACD0-46128944E1DC}"/>
               </a:ext>
             </a:extLst>
           </p:cNvPr>
@@ -19238,7 +20208,7 @@
           <p:cNvPr id="4" name="Rectangle 1">
             <a:extLst>
               <a:ext uri="{FF2B5EF4-FFF2-40B4-BE49-F238E27FC236}">
-                <a16:creationId xmlns:a16="http://schemas.microsoft.com/office/drawing/2014/main" xmlns="" id="{777A63C4-BDFD-4E85-A3C7-4D9E9D8742DE}"/>
+                <a16:creationId xmlns="" xmlns:a16="http://schemas.microsoft.com/office/drawing/2014/main" id="{777A63C4-BDFD-4E85-A3C7-4D9E9D8742DE}"/>
               </a:ext>
             </a:extLst>
           </p:cNvPr>
@@ -19754,6 +20724,13 @@
   <p:clrMapOvr>
     <a:masterClrMapping/>
   </p:clrMapOvr>
+  <p:timing>
+    <p:tnLst>
+      <p:par>
+        <p:cTn id="1" dur="indefinite" restart="never" nodeType="tmRoot"/>
+      </p:par>
+    </p:tnLst>
+  </p:timing>
 </p:sld>
 </file>
 
@@ -19779,7 +20756,7 @@
           <p:cNvPr id="2" name="Title 1">
             <a:extLst>
               <a:ext uri="{FF2B5EF4-FFF2-40B4-BE49-F238E27FC236}">
-                <a16:creationId xmlns:a16="http://schemas.microsoft.com/office/drawing/2014/main" xmlns="" id="{71884456-5167-4632-8188-3CB610CF446B}"/>
+                <a16:creationId xmlns="" xmlns:a16="http://schemas.microsoft.com/office/drawing/2014/main" id="{71884456-5167-4632-8188-3CB610CF446B}"/>
               </a:ext>
             </a:extLst>
           </p:cNvPr>
@@ -19808,7 +20785,7 @@
           <p:cNvPr id="4" name="Rectangle 1">
             <a:extLst>
               <a:ext uri="{FF2B5EF4-FFF2-40B4-BE49-F238E27FC236}">
-                <a16:creationId xmlns:a16="http://schemas.microsoft.com/office/drawing/2014/main" xmlns="" id="{D184D4BD-BFF3-44CC-9B06-1400727F5051}"/>
+                <a16:creationId xmlns="" xmlns:a16="http://schemas.microsoft.com/office/drawing/2014/main" id="{D184D4BD-BFF3-44CC-9B06-1400727F5051}"/>
               </a:ext>
             </a:extLst>
           </p:cNvPr>
@@ -20279,6 +21256,13 @@
   <p:clrMapOvr>
     <a:masterClrMapping/>
   </p:clrMapOvr>
+  <p:timing>
+    <p:tnLst>
+      <p:par>
+        <p:cTn id="1" dur="indefinite" restart="never" nodeType="tmRoot"/>
+      </p:par>
+    </p:tnLst>
+  </p:timing>
 </p:sld>
 </file>
 
@@ -20301,10 +21285,144 @@
       </p:grpSpPr>
       <p:sp>
         <p:nvSpPr>
+          <p:cNvPr id="2" name="Rectangle 1"/>
+          <p:cNvSpPr/>
+          <p:nvPr/>
+        </p:nvSpPr>
+        <p:spPr>
+          <a:xfrm>
+            <a:off x="762000" y="2274838"/>
+            <a:ext cx="7772400" cy="3693319"/>
+          </a:xfrm>
+          <a:prstGeom prst="rect">
+            <a:avLst/>
+          </a:prstGeom>
+        </p:spPr>
+        <p:txBody>
+          <a:bodyPr wrap="square">
+            <a:spAutoFit/>
+          </a:bodyPr>
+          <a:lstStyle/>
+          <a:p>
+            <a:r>
+              <a:rPr lang="en-US" dirty="0" err="1"/>
+              <a:t>XGBoost</a:t>
+            </a:r>
+            <a:r>
+              <a:rPr lang="en-US" dirty="0"/>
+              <a:t>, short for "Extreme Gradient Boosting," is </a:t>
+            </a:r>
+            <a:r>
+              <a:rPr lang="en-US" dirty="0"/>
+              <a:t>a machine learning algorithm that combines multiple decision trees in a sequential manner, </a:t>
+            </a:r>
+            <a:endParaRPr lang="en-US" dirty="0" smtClean="0"/>
+          </a:p>
+          <a:p>
+            <a:r>
+              <a:rPr lang="en-US" dirty="0" smtClean="0"/>
+              <a:t>where </a:t>
+            </a:r>
+            <a:r>
+              <a:rPr lang="en-US" dirty="0"/>
+              <a:t>each new tree learns from the errors of the previous ones, progressively improving the overall prediction accuracy by focusing on the areas where the previous model made mistakes</a:t>
+            </a:r>
+            <a:r>
+              <a:rPr lang="en-US" dirty="0"/>
+              <a:t>, </a:t>
+            </a:r>
+            <a:endParaRPr lang="en-US" dirty="0" smtClean="0"/>
+          </a:p>
+          <a:p>
+            <a:endParaRPr lang="en-US" dirty="0"/>
+          </a:p>
+          <a:p>
+            <a:endParaRPr lang="en-US" dirty="0" smtClean="0"/>
+          </a:p>
+          <a:p>
+            <a:r>
+              <a:rPr lang="en-US" dirty="0" smtClean="0"/>
+              <a:t>Simple words : </a:t>
+            </a:r>
+            <a:r>
+              <a:rPr lang="en-US" dirty="0" err="1" smtClean="0"/>
+              <a:t>XGBoost</a:t>
+            </a:r>
+            <a:r>
+              <a:rPr lang="en-US" dirty="0" smtClean="0"/>
+              <a:t> </a:t>
+            </a:r>
+            <a:r>
+              <a:rPr lang="en-US" dirty="0"/>
+              <a:t>is a boosting algorithm that uses bagging, which trains multiple decision trees and then combines the results</a:t>
+            </a:r>
+            <a:r>
+              <a:rPr lang="en-US" dirty="0" smtClean="0"/>
+              <a:t>.</a:t>
+            </a:r>
+          </a:p>
+          <a:p>
+            <a:endParaRPr lang="en-US" dirty="0" smtClean="0"/>
+          </a:p>
+          <a:p>
+            <a:r>
+              <a:rPr lang="en-US" dirty="0" err="1"/>
+              <a:t>XGBoost</a:t>
+            </a:r>
+            <a:r>
+              <a:rPr lang="en-US" dirty="0"/>
+              <a:t> uses decision trees as its base learners combining them sequentially to improve the model's performance.</a:t>
+            </a:r>
+            <a:endParaRPr lang="en-US" dirty="0"/>
+          </a:p>
+          <a:p>
+            <a:endParaRPr lang="en-IN" dirty="0"/>
+          </a:p>
+        </p:txBody>
+      </p:sp>
+    </p:spTree>
+    <p:extLst>
+      <p:ext uri="{BB962C8B-B14F-4D97-AF65-F5344CB8AC3E}">
+        <p14:creationId xmlns:p14="http://schemas.microsoft.com/office/powerpoint/2010/main" val="3040753249"/>
+      </p:ext>
+    </p:extLst>
+  </p:cSld>
+  <p:clrMapOvr>
+    <a:masterClrMapping/>
+  </p:clrMapOvr>
+  <p:timing>
+    <p:tnLst>
+      <p:par>
+        <p:cTn id="1" dur="indefinite" restart="never" nodeType="tmRoot"/>
+      </p:par>
+    </p:tnLst>
+  </p:timing>
+</p:sld>
+</file>
+
+<file path=ppt/slides/slide9.xml><?xml version="1.0" encoding="utf-8"?>
+<p:sld xmlns:a="http://schemas.openxmlformats.org/drawingml/2006/main" xmlns:r="http://schemas.openxmlformats.org/officeDocument/2006/relationships" xmlns:p="http://schemas.openxmlformats.org/presentationml/2006/main">
+  <p:cSld>
+    <p:spTree>
+      <p:nvGrpSpPr>
+        <p:cNvPr id="1" name=""/>
+        <p:cNvGrpSpPr/>
+        <p:nvPr/>
+      </p:nvGrpSpPr>
+      <p:grpSpPr>
+        <a:xfrm>
+          <a:off x="0" y="0"/>
+          <a:ext cx="0" cy="0"/>
+          <a:chOff x="0" y="0"/>
+          <a:chExt cx="0" cy="0"/>
+        </a:xfrm>
+      </p:grpSpPr>
+      <p:sp>
+        <p:nvSpPr>
           <p:cNvPr id="2" name="Title 1">
             <a:extLst>
               <a:ext uri="{FF2B5EF4-FFF2-40B4-BE49-F238E27FC236}">
-                <a16:creationId xmlns:a16="http://schemas.microsoft.com/office/drawing/2014/main" xmlns="" id="{2D5169FB-0C52-427D-95F2-F4180745F88B}"/>
+                <a16:creationId xmlns="" xmlns:a16="http://schemas.microsoft.com/office/drawing/2014/main" id="{2D5169FB-0C52-427D-95F2-F4180745F88B}"/>
               </a:ext>
             </a:extLst>
           </p:cNvPr>
@@ -20333,7 +21451,7 @@
           <p:cNvPr id="5" name="Content Placeholder 4">
             <a:extLst>
               <a:ext uri="{FF2B5EF4-FFF2-40B4-BE49-F238E27FC236}">
-                <a16:creationId xmlns:a16="http://schemas.microsoft.com/office/drawing/2014/main" xmlns="" id="{2B2D3DA8-D315-4FF3-9445-5C7A494CAC05}"/>
+                <a16:creationId xmlns="" xmlns:a16="http://schemas.microsoft.com/office/drawing/2014/main" id="{2B2D3DA8-D315-4FF3-9445-5C7A494CAC05}"/>
               </a:ext>
             </a:extLst>
           </p:cNvPr>
@@ -20367,445 +21485,13 @@
   <p:clrMapOvr>
     <a:masterClrMapping/>
   </p:clrMapOvr>
-</p:sld>
-</file>
-
-<file path=ppt/slides/slide9.xml><?xml version="1.0" encoding="utf-8"?>
-<p:sld xmlns:a="http://schemas.openxmlformats.org/drawingml/2006/main" xmlns:r="http://schemas.openxmlformats.org/officeDocument/2006/relationships" xmlns:p="http://schemas.openxmlformats.org/presentationml/2006/main">
-  <p:cSld>
-    <p:spTree>
-      <p:nvGrpSpPr>
-        <p:cNvPr id="1" name=""/>
-        <p:cNvGrpSpPr/>
-        <p:nvPr/>
-      </p:nvGrpSpPr>
-      <p:grpSpPr>
-        <a:xfrm>
-          <a:off x="0" y="0"/>
-          <a:ext cx="0" cy="0"/>
-          <a:chOff x="0" y="0"/>
-          <a:chExt cx="0" cy="0"/>
-        </a:xfrm>
-      </p:grpSpPr>
-      <p:sp>
-        <p:nvSpPr>
-          <p:cNvPr id="2" name="Title 1">
-            <a:extLst>
-              <a:ext uri="{FF2B5EF4-FFF2-40B4-BE49-F238E27FC236}">
-                <a16:creationId xmlns:a16="http://schemas.microsoft.com/office/drawing/2014/main" xmlns="" id="{14E6FFD6-066D-47FB-ACD0-46128944E1DC}"/>
-              </a:ext>
-            </a:extLst>
-          </p:cNvPr>
-          <p:cNvSpPr>
-            <a:spLocks noGrp="1"/>
-          </p:cNvSpPr>
-          <p:nvPr>
-            <p:ph type="title"/>
-          </p:nvPr>
-        </p:nvSpPr>
-        <p:spPr/>
-        <p:txBody>
-          <a:bodyPr/>
-          <a:lstStyle/>
-          <a:p>
-            <a:r>
-              <a:rPr lang="en-US" dirty="0"/>
-              <a:t>XG Boost - Applications</a:t>
-            </a:r>
-            <a:endParaRPr lang="en-IN" dirty="0"/>
-          </a:p>
-        </p:txBody>
-      </p:sp>
-      <p:sp>
-        <p:nvSpPr>
-          <p:cNvPr id="6" name="Rectangle 3">
-            <a:extLst>
-              <a:ext uri="{FF2B5EF4-FFF2-40B4-BE49-F238E27FC236}">
-                <a16:creationId xmlns:a16="http://schemas.microsoft.com/office/drawing/2014/main" xmlns="" id="{8F2C95CB-A78D-44B6-B7F8-320CC6C8A0B7}"/>
-              </a:ext>
-            </a:extLst>
-          </p:cNvPr>
-          <p:cNvSpPr>
-            <a:spLocks noGrp="1" noChangeArrowheads="1"/>
-          </p:cNvSpPr>
-          <p:nvPr>
-            <p:ph idx="1"/>
-          </p:nvPr>
-        </p:nvSpPr>
-        <p:spPr bwMode="auto">
-          <a:xfrm>
-            <a:off x="381000" y="2438400"/>
-            <a:ext cx="7959612" cy="3970318"/>
-          </a:xfrm>
-          <a:prstGeom prst="rect">
-            <a:avLst/>
-          </a:prstGeom>
-          <a:noFill/>
-          <a:ln>
-            <a:noFill/>
-          </a:ln>
-          <a:effectLst/>
-          <a:extLst>
-            <a:ext uri="{909E8E84-426E-40DD-AFC4-6F175D3DCCD1}">
-              <a14:hiddenFill xmlns:a14="http://schemas.microsoft.com/office/drawing/2010/main">
-                <a:solidFill>
-                  <a:schemeClr val="accent1"/>
-                </a:solidFill>
-              </a14:hiddenFill>
-            </a:ext>
-            <a:ext uri="{91240B29-F687-4F45-9708-019B960494DF}">
-              <a14:hiddenLine xmlns:a14="http://schemas.microsoft.com/office/drawing/2010/main" w="9525">
-                <a:solidFill>
-                  <a:schemeClr val="tx1"/>
-                </a:solidFill>
-                <a:miter lim="800000"/>
-                <a:headEnd/>
-                <a:tailEnd/>
-              </a14:hiddenLine>
-            </a:ext>
-            <a:ext uri="{AF507438-7753-43E0-B8FC-AC1667EBCBE1}">
-              <a14:hiddenEffects xmlns:a14="http://schemas.microsoft.com/office/drawing/2010/main">
-                <a:effectLst>
-                  <a:outerShdw dist="35921" dir="2700000" algn="ctr" rotWithShape="0">
-                    <a:schemeClr val="bg2"/>
-                  </a:outerShdw>
-                </a:effectLst>
-              </a14:hiddenEffects>
-            </a:ext>
-          </a:extLst>
-        </p:spPr>
-        <p:txBody>
-          <a:bodyPr vert="horz" wrap="square" lIns="91440" tIns="45720" rIns="91440" bIns="45720" numCol="1" anchor="ctr" anchorCtr="0" compatLnSpc="1">
-            <a:prstTxWarp prst="textNoShape">
-              <a:avLst/>
-            </a:prstTxWarp>
-            <a:spAutoFit/>
-          </a:bodyPr>
-          <a:lstStyle/>
-          <a:p>
-            <a:pPr marL="0" marR="0" lvl="0" indent="0" algn="l" defTabSz="914400" rtl="0" eaLnBrk="0" fontAlgn="base" latinLnBrk="0" hangingPunct="0">
-              <a:lnSpc>
-                <a:spcPct val="100000"/>
-              </a:lnSpc>
-              <a:spcBef>
-                <a:spcPct val="0"/>
-              </a:spcBef>
-              <a:spcAft>
-                <a:spcPct val="0"/>
-              </a:spcAft>
-              <a:buClrTx/>
-              <a:buSzTx/>
-              <a:buNone/>
-              <a:tabLst/>
-            </a:pPr>
-            <a:r>
-              <a:rPr kumimoji="0" lang="en-US" altLang="en-US" sz="1800" b="1" i="0" u="none" strike="noStrike" cap="none" normalizeH="0" baseline="0" dirty="0">
-                <a:ln>
-                  <a:noFill/>
-                </a:ln>
-                <a:solidFill>
-                  <a:schemeClr val="tx1"/>
-                </a:solidFill>
-                <a:effectLst/>
-              </a:rPr>
-              <a:t>Finance:</a:t>
-            </a:r>
-            <a:r>
-              <a:rPr kumimoji="0" lang="en-US" altLang="en-US" sz="1800" b="0" i="0" u="none" strike="noStrike" cap="none" normalizeH="0" baseline="0" dirty="0">
-                <a:ln>
-                  <a:noFill/>
-                </a:ln>
-                <a:solidFill>
-                  <a:schemeClr val="tx1"/>
-                </a:solidFill>
-                <a:effectLst/>
-              </a:rPr>
-              <a:t> Widely used in predicting stock prices, credit scoring, and detecting fraudulent transactions.</a:t>
-            </a:r>
-          </a:p>
-          <a:p>
-            <a:pPr marL="0" marR="0" lvl="0" indent="0" algn="l" defTabSz="914400" rtl="0" eaLnBrk="0" fontAlgn="base" latinLnBrk="0" hangingPunct="0">
-              <a:lnSpc>
-                <a:spcPct val="100000"/>
-              </a:lnSpc>
-              <a:spcBef>
-                <a:spcPct val="0"/>
-              </a:spcBef>
-              <a:spcAft>
-                <a:spcPct val="0"/>
-              </a:spcAft>
-              <a:buClrTx/>
-              <a:buSzTx/>
-              <a:buNone/>
-              <a:tabLst/>
-            </a:pPr>
-            <a:endParaRPr kumimoji="0" lang="en-US" altLang="en-US" sz="1800" b="0" i="0" u="none" strike="noStrike" cap="none" normalizeH="0" baseline="0" dirty="0">
-              <a:ln>
-                <a:noFill/>
-              </a:ln>
-              <a:solidFill>
-                <a:schemeClr val="tx1"/>
-              </a:solidFill>
-              <a:effectLst/>
-            </a:endParaRPr>
-          </a:p>
-          <a:p>
-            <a:pPr marL="0" marR="0" lvl="0" indent="0" algn="l" defTabSz="914400" rtl="0" eaLnBrk="0" fontAlgn="base" latinLnBrk="0" hangingPunct="0">
-              <a:lnSpc>
-                <a:spcPct val="100000"/>
-              </a:lnSpc>
-              <a:spcBef>
-                <a:spcPct val="0"/>
-              </a:spcBef>
-              <a:spcAft>
-                <a:spcPct val="0"/>
-              </a:spcAft>
-              <a:buClrTx/>
-              <a:buSzTx/>
-              <a:buNone/>
-              <a:tabLst/>
-            </a:pPr>
-            <a:r>
-              <a:rPr kumimoji="0" lang="en-US" altLang="en-US" sz="1800" b="1" i="0" u="none" strike="noStrike" cap="none" normalizeH="0" baseline="0" dirty="0">
-                <a:ln>
-                  <a:noFill/>
-                </a:ln>
-                <a:solidFill>
-                  <a:schemeClr val="tx1"/>
-                </a:solidFill>
-                <a:effectLst/>
-              </a:rPr>
-              <a:t>Healthcare:</a:t>
-            </a:r>
-            <a:r>
-              <a:rPr kumimoji="0" lang="en-US" altLang="en-US" sz="1800" b="0" i="0" u="none" strike="noStrike" cap="none" normalizeH="0" baseline="0" dirty="0">
-                <a:ln>
-                  <a:noFill/>
-                </a:ln>
-                <a:solidFill>
-                  <a:schemeClr val="tx1"/>
-                </a:solidFill>
-                <a:effectLst/>
-              </a:rPr>
-              <a:t> Applied in disease prediction, patient outcome forecasting, and medical image analysis.</a:t>
-            </a:r>
-          </a:p>
-          <a:p>
-            <a:pPr marL="0" marR="0" lvl="0" indent="0" algn="l" defTabSz="914400" rtl="0" eaLnBrk="0" fontAlgn="base" latinLnBrk="0" hangingPunct="0">
-              <a:lnSpc>
-                <a:spcPct val="100000"/>
-              </a:lnSpc>
-              <a:spcBef>
-                <a:spcPct val="0"/>
-              </a:spcBef>
-              <a:spcAft>
-                <a:spcPct val="0"/>
-              </a:spcAft>
-              <a:buClrTx/>
-              <a:buSzTx/>
-              <a:buFontTx/>
-              <a:buChar char="•"/>
-              <a:tabLst/>
-            </a:pPr>
-            <a:endParaRPr kumimoji="0" lang="en-US" altLang="en-US" sz="1800" b="0" i="0" u="none" strike="noStrike" cap="none" normalizeH="0" baseline="0" dirty="0">
-              <a:ln>
-                <a:noFill/>
-              </a:ln>
-              <a:solidFill>
-                <a:schemeClr val="tx1"/>
-              </a:solidFill>
-              <a:effectLst/>
-            </a:endParaRPr>
-          </a:p>
-          <a:p>
-            <a:pPr marL="0" marR="0" lvl="0" indent="0" algn="l" defTabSz="914400" rtl="0" eaLnBrk="0" fontAlgn="base" latinLnBrk="0" hangingPunct="0">
-              <a:lnSpc>
-                <a:spcPct val="100000"/>
-              </a:lnSpc>
-              <a:spcBef>
-                <a:spcPct val="0"/>
-              </a:spcBef>
-              <a:spcAft>
-                <a:spcPct val="0"/>
-              </a:spcAft>
-              <a:buClrTx/>
-              <a:buSzTx/>
-              <a:buNone/>
-              <a:tabLst/>
-            </a:pPr>
-            <a:r>
-              <a:rPr kumimoji="0" lang="en-US" altLang="en-US" sz="1800" b="1" i="0" u="none" strike="noStrike" cap="none" normalizeH="0" baseline="0" dirty="0">
-                <a:ln>
-                  <a:noFill/>
-                </a:ln>
-                <a:solidFill>
-                  <a:schemeClr val="tx1"/>
-                </a:solidFill>
-                <a:effectLst/>
-              </a:rPr>
-              <a:t>Marketing:</a:t>
-            </a:r>
-            <a:r>
-              <a:rPr kumimoji="0" lang="en-US" altLang="en-US" sz="1800" b="0" i="0" u="none" strike="noStrike" cap="none" normalizeH="0" baseline="0" dirty="0">
-                <a:ln>
-                  <a:noFill/>
-                </a:ln>
-                <a:solidFill>
-                  <a:schemeClr val="tx1"/>
-                </a:solidFill>
-                <a:effectLst/>
-              </a:rPr>
-              <a:t> Helps in customer segmentation, churn prediction, and personalized recommendation systems.</a:t>
-            </a:r>
-          </a:p>
-          <a:p>
-            <a:pPr marL="0" marR="0" lvl="0" indent="0" algn="l" defTabSz="914400" rtl="0" eaLnBrk="0" fontAlgn="base" latinLnBrk="0" hangingPunct="0">
-              <a:lnSpc>
-                <a:spcPct val="100000"/>
-              </a:lnSpc>
-              <a:spcBef>
-                <a:spcPct val="0"/>
-              </a:spcBef>
-              <a:spcAft>
-                <a:spcPct val="0"/>
-              </a:spcAft>
-              <a:buClrTx/>
-              <a:buSzTx/>
-              <a:buFontTx/>
-              <a:buChar char="•"/>
-              <a:tabLst/>
-            </a:pPr>
-            <a:endParaRPr kumimoji="0" lang="en-US" altLang="en-US" sz="1800" b="0" i="0" u="none" strike="noStrike" cap="none" normalizeH="0" baseline="0" dirty="0">
-              <a:ln>
-                <a:noFill/>
-              </a:ln>
-              <a:solidFill>
-                <a:schemeClr val="tx1"/>
-              </a:solidFill>
-              <a:effectLst/>
-            </a:endParaRPr>
-          </a:p>
-          <a:p>
-            <a:pPr marL="0" marR="0" lvl="0" indent="0" algn="l" defTabSz="914400" rtl="0" eaLnBrk="0" fontAlgn="base" latinLnBrk="0" hangingPunct="0">
-              <a:lnSpc>
-                <a:spcPct val="100000"/>
-              </a:lnSpc>
-              <a:spcBef>
-                <a:spcPct val="0"/>
-              </a:spcBef>
-              <a:spcAft>
-                <a:spcPct val="0"/>
-              </a:spcAft>
-              <a:buClrTx/>
-              <a:buSzTx/>
-              <a:buNone/>
-              <a:tabLst/>
-            </a:pPr>
-            <a:r>
-              <a:rPr kumimoji="0" lang="en-US" altLang="en-US" sz="1800" b="1" i="0" u="none" strike="noStrike" cap="none" normalizeH="0" baseline="0" dirty="0">
-                <a:ln>
-                  <a:noFill/>
-                </a:ln>
-                <a:solidFill>
-                  <a:schemeClr val="tx1"/>
-                </a:solidFill>
-                <a:effectLst/>
-              </a:rPr>
-              <a:t>Competition Success:</a:t>
-            </a:r>
-            <a:r>
-              <a:rPr kumimoji="0" lang="en-US" altLang="en-US" sz="1800" b="0" i="0" u="none" strike="noStrike" cap="none" normalizeH="0" baseline="0" dirty="0">
-                <a:ln>
-                  <a:noFill/>
-                </a:ln>
-                <a:solidFill>
-                  <a:schemeClr val="tx1"/>
-                </a:solidFill>
-                <a:effectLst/>
-              </a:rPr>
-              <a:t> Frequently used by data scientists to win machine learning competitions on platforms like Kaggle.</a:t>
-            </a:r>
-          </a:p>
-          <a:p>
-            <a:pPr marL="0" marR="0" lvl="0" indent="0" algn="l" defTabSz="914400" rtl="0" eaLnBrk="0" fontAlgn="base" latinLnBrk="0" hangingPunct="0">
-              <a:lnSpc>
-                <a:spcPct val="100000"/>
-              </a:lnSpc>
-              <a:spcBef>
-                <a:spcPct val="0"/>
-              </a:spcBef>
-              <a:spcAft>
-                <a:spcPct val="0"/>
-              </a:spcAft>
-              <a:buClrTx/>
-              <a:buSzTx/>
-              <a:buFontTx/>
-              <a:buChar char="•"/>
-              <a:tabLst/>
-            </a:pPr>
-            <a:endParaRPr kumimoji="0" lang="en-US" altLang="en-US" sz="1800" b="0" i="0" u="none" strike="noStrike" cap="none" normalizeH="0" baseline="0" dirty="0">
-              <a:ln>
-                <a:noFill/>
-              </a:ln>
-              <a:solidFill>
-                <a:schemeClr val="tx1"/>
-              </a:solidFill>
-              <a:effectLst/>
-            </a:endParaRPr>
-          </a:p>
-          <a:p>
-            <a:pPr marL="0" marR="0" lvl="0" indent="0" algn="l" defTabSz="914400" rtl="0" eaLnBrk="0" fontAlgn="base" latinLnBrk="0" hangingPunct="0">
-              <a:lnSpc>
-                <a:spcPct val="100000"/>
-              </a:lnSpc>
-              <a:spcBef>
-                <a:spcPct val="0"/>
-              </a:spcBef>
-              <a:spcAft>
-                <a:spcPct val="0"/>
-              </a:spcAft>
-              <a:buClrTx/>
-              <a:buSzTx/>
-              <a:buNone/>
-              <a:tabLst/>
-            </a:pPr>
-            <a:r>
-              <a:rPr kumimoji="0" lang="en-US" altLang="en-US" sz="1800" b="1" i="0" u="none" strike="noStrike" cap="none" normalizeH="0" baseline="0" dirty="0">
-                <a:ln>
-                  <a:noFill/>
-                </a:ln>
-                <a:solidFill>
-                  <a:schemeClr val="tx1"/>
-                </a:solidFill>
-                <a:effectLst/>
-              </a:rPr>
-              <a:t>Retail:</a:t>
-            </a:r>
-            <a:r>
-              <a:rPr kumimoji="0" lang="en-US" altLang="en-US" sz="1800" b="0" i="0" u="none" strike="noStrike" cap="none" normalizeH="0" baseline="0" dirty="0">
-                <a:ln>
-                  <a:noFill/>
-                </a:ln>
-                <a:solidFill>
-                  <a:schemeClr val="tx1"/>
-                </a:solidFill>
-                <a:effectLst/>
-              </a:rPr>
-              <a:t> Used in demand forecasting, inventory management, and optimizing supply chain processes. </a:t>
-            </a:r>
-          </a:p>
-        </p:txBody>
-      </p:sp>
-    </p:spTree>
-    <p:extLst>
-      <p:ext uri="{BB962C8B-B14F-4D97-AF65-F5344CB8AC3E}">
-        <p14:creationId xmlns:p14="http://schemas.microsoft.com/office/powerpoint/2010/main" val="1203277047"/>
-      </p:ext>
-    </p:extLst>
-  </p:cSld>
-  <p:clrMapOvr>
-    <a:masterClrMapping/>
-  </p:clrMapOvr>
+  <p:timing>
+    <p:tnLst>
+      <p:par>
+        <p:cTn id="1" dur="indefinite" restart="never" nodeType="tmRoot"/>
+      </p:par>
+    </p:tnLst>
+  </p:timing>
 </p:sld>
 </file>
 

</xml_diff>